<commit_message>
PPT + debut elastic
</commit_message>
<xml_diff>
--- a/PPT Gastronome Gourmand.pptx
+++ b/PPT Gastronome Gourmand.pptx
@@ -4945,6 +4945,13 @@
       <p:transition/>
     </mc:Fallback>
   </mc:AlternateContent>
+  <p:timing>
+    <p:tnLst>
+      <p:par>
+        <p:cTn id="1" dur="indefinite" restart="never" nodeType="tmRoot"/>
+      </p:par>
+    </p:tnLst>
+  </p:timing>
 </p:sld>
 </file>
 
@@ -5391,6 +5398,13 @@
       <p:transition/>
     </mc:Fallback>
   </mc:AlternateContent>
+  <p:timing>
+    <p:tnLst>
+      <p:par>
+        <p:cTn id="1" dur="indefinite" restart="never" nodeType="tmRoot"/>
+      </p:par>
+    </p:tnLst>
+  </p:timing>
 </p:sld>
 </file>
 
@@ -5553,6 +5567,13 @@
       <p:transition/>
     </mc:Fallback>
   </mc:AlternateContent>
+  <p:timing>
+    <p:tnLst>
+      <p:par>
+        <p:cTn id="1" dur="indefinite" restart="never" nodeType="tmRoot"/>
+      </p:par>
+    </p:tnLst>
+  </p:timing>
 </p:sld>
 </file>
 
@@ -5817,6 +5838,13 @@
       <p:transition/>
     </mc:Fallback>
   </mc:AlternateContent>
+  <p:timing>
+    <p:tnLst>
+      <p:par>
+        <p:cTn id="1" dur="indefinite" restart="never" nodeType="tmRoot"/>
+      </p:par>
+    </p:tnLst>
+  </p:timing>
 </p:sld>
 </file>
 
@@ -5997,6 +6025,13 @@
       <p:transition/>
     </mc:Fallback>
   </mc:AlternateContent>
+  <p:timing>
+    <p:tnLst>
+      <p:par>
+        <p:cTn id="1" dur="indefinite" restart="never" nodeType="tmRoot"/>
+      </p:par>
+    </p:tnLst>
+  </p:timing>
 </p:sld>
 </file>
 
@@ -6180,6 +6215,13 @@
       <p:transition/>
     </mc:Fallback>
   </mc:AlternateContent>
+  <p:timing>
+    <p:tnLst>
+      <p:par>
+        <p:cTn id="1" dur="indefinite" restart="never" nodeType="tmRoot"/>
+      </p:par>
+    </p:tnLst>
+  </p:timing>
 </p:sld>
 </file>
 
@@ -6360,6 +6402,13 @@
       <p:transition/>
     </mc:Fallback>
   </mc:AlternateContent>
+  <p:timing>
+    <p:tnLst>
+      <p:par>
+        <p:cTn id="1" dur="indefinite" restart="never" nodeType="tmRoot"/>
+      </p:par>
+    </p:tnLst>
+  </p:timing>
 </p:sld>
 </file>
 
@@ -6540,6 +6589,13 @@
       <p:transition/>
     </mc:Fallback>
   </mc:AlternateContent>
+  <p:timing>
+    <p:tnLst>
+      <p:par>
+        <p:cTn id="1" dur="indefinite" restart="never" nodeType="tmRoot"/>
+      </p:par>
+    </p:tnLst>
+  </p:timing>
 </p:sld>
 </file>
 
@@ -6708,6 +6764,13 @@
       <p:transition/>
     </mc:Fallback>
   </mc:AlternateContent>
+  <p:timing>
+    <p:tnLst>
+      <p:par>
+        <p:cTn id="1" dur="indefinite" restart="never" nodeType="tmRoot"/>
+      </p:par>
+    </p:tnLst>
+  </p:timing>
 </p:sld>
 </file>
 
@@ -6894,6 +6957,13 @@
       <p:transition/>
     </mc:Fallback>
   </mc:AlternateContent>
+  <p:timing>
+    <p:tnLst>
+      <p:par>
+        <p:cTn id="1" dur="indefinite" restart="never" nodeType="tmRoot"/>
+      </p:par>
+    </p:tnLst>
+  </p:timing>
 </p:sld>
 </file>
 
@@ -7158,6 +7228,13 @@
       <p:transition/>
     </mc:Fallback>
   </mc:AlternateContent>
+  <p:timing>
+    <p:tnLst>
+      <p:par>
+        <p:cTn id="1" dur="indefinite" restart="never" nodeType="tmRoot"/>
+      </p:par>
+    </p:tnLst>
+  </p:timing>
 </p:sld>
 </file>
 
@@ -7310,6 +7387,13 @@
       <p:transition/>
     </mc:Fallback>
   </mc:AlternateContent>
+  <p:timing>
+    <p:tnLst>
+      <p:par>
+        <p:cTn id="1" dur="indefinite" restart="never" nodeType="tmRoot"/>
+      </p:par>
+    </p:tnLst>
+  </p:timing>
 </p:sld>
 </file>
 
@@ -7490,6 +7574,13 @@
       <p:transition/>
     </mc:Fallback>
   </mc:AlternateContent>
+  <p:timing>
+    <p:tnLst>
+      <p:par>
+        <p:cTn id="1" dur="indefinite" restart="never" nodeType="tmRoot"/>
+      </p:par>
+    </p:tnLst>
+  </p:timing>
 </p:sld>
 </file>
 
@@ -8606,6 +8697,13 @@
       <p:transition/>
     </mc:Fallback>
   </mc:AlternateContent>
+  <p:timing>
+    <p:tnLst>
+      <p:par>
+        <p:cTn id="1" dur="indefinite" restart="never" nodeType="tmRoot"/>
+      </p:par>
+    </p:tnLst>
+  </p:timing>
 </p:sld>
 </file>
 
@@ -9134,6 +9232,13 @@
       <p:transition/>
     </mc:Fallback>
   </mc:AlternateContent>
+  <p:timing>
+    <p:tnLst>
+      <p:par>
+        <p:cTn id="1" dur="indefinite" restart="never" nodeType="tmRoot"/>
+      </p:par>
+    </p:tnLst>
+  </p:timing>
 </p:sld>
 </file>
 
@@ -9286,6 +9391,13 @@
       <p:transition/>
     </mc:Fallback>
   </mc:AlternateContent>
+  <p:timing>
+    <p:tnLst>
+      <p:par>
+        <p:cTn id="1" dur="indefinite" restart="never" nodeType="tmRoot"/>
+      </p:par>
+    </p:tnLst>
+  </p:timing>
 </p:sld>
 </file>
 
@@ -9647,6 +9759,13 @@
       <p:transition/>
     </mc:Fallback>
   </mc:AlternateContent>
+  <p:timing>
+    <p:tnLst>
+      <p:par>
+        <p:cTn id="1" dur="indefinite" restart="never" nodeType="tmRoot"/>
+      </p:par>
+    </p:tnLst>
+  </p:timing>
 </p:sld>
 </file>
 
@@ -9871,6 +9990,13 @@
       <p:transition/>
     </mc:Fallback>
   </mc:AlternateContent>
+  <p:timing>
+    <p:tnLst>
+      <p:par>
+        <p:cTn id="1" dur="indefinite" restart="never" nodeType="tmRoot"/>
+      </p:par>
+    </p:tnLst>
+  </p:timing>
 </p:sld>
 </file>
 
@@ -10508,6 +10634,13 @@
       <p:transition/>
     </mc:Fallback>
   </mc:AlternateContent>
+  <p:timing>
+    <p:tnLst>
+      <p:par>
+        <p:cTn id="1" dur="indefinite" restart="never" nodeType="tmRoot"/>
+      </p:par>
+    </p:tnLst>
+  </p:timing>
 </p:sld>
 </file>
 
@@ -10530,42 +10663,6 @@
       </p:grpSpPr>
       <p:sp>
         <p:nvSpPr>
-          <p:cNvPr id="3" name="Espace réservé du contenu 2"/>
-          <p:cNvSpPr>
-            <a:spLocks noGrp="1"/>
-          </p:cNvSpPr>
-          <p:nvPr>
-            <p:ph idx="13"/>
-          </p:nvPr>
-        </p:nvSpPr>
-        <p:spPr>
-          <a:xfrm>
-            <a:off x="1763688" y="1844824"/>
-            <a:ext cx="5349280" cy="2062935"/>
-          </a:xfrm>
-        </p:spPr>
-        <p:txBody>
-          <a:bodyPr>
-            <a:normAutofit/>
-          </a:bodyPr>
-          <a:lstStyle/>
-          <a:p>
-            <a:pPr marL="0" indent="0" algn="ctr">
-              <a:buNone/>
-            </a:pPr>
-            <a:r>
-              <a:rPr lang="fr-FR" b="1" i="1" dirty="0">
-                <a:solidFill>
-                  <a:srgbClr val="D60037"/>
-                </a:solidFill>
-              </a:rPr>
-              <a:t>Schéma dispositif</a:t>
-            </a:r>
-          </a:p>
-        </p:txBody>
-      </p:sp>
-      <p:sp>
-        <p:nvSpPr>
           <p:cNvPr id="4" name="Espace réservé de la date 3"/>
           <p:cNvSpPr>
             <a:spLocks noGrp="1"/>
@@ -10658,6 +10755,388 @@
               <a:rPr lang="fr-FR" sz="3600" dirty="0"/>
               <a:t>Architecture / technologies</a:t>
             </a:r>
+          </a:p>
+        </p:txBody>
+      </p:sp>
+      <p:pic>
+        <p:nvPicPr>
+          <p:cNvPr id="7" name="Image 6"/>
+          <p:cNvPicPr>
+            <a:picLocks noChangeAspect="1"/>
+          </p:cNvPicPr>
+          <p:nvPr/>
+        </p:nvPicPr>
+        <p:blipFill>
+          <a:blip r:embed="rId2" cstate="email">
+            <a:extLst>
+              <a:ext uri="{28A0092B-C50C-407E-A947-70E740481C1C}">
+                <a14:useLocalDpi xmlns:a14="http://schemas.microsoft.com/office/drawing/2010/main" val="0"/>
+              </a:ext>
+            </a:extLst>
+          </a:blip>
+          <a:stretch>
+            <a:fillRect/>
+          </a:stretch>
+        </p:blipFill>
+        <p:spPr>
+          <a:xfrm>
+            <a:off x="454325" y="2371228"/>
+            <a:ext cx="1590352" cy="1955593"/>
+          </a:xfrm>
+          <a:prstGeom prst="rect">
+            <a:avLst/>
+          </a:prstGeom>
+        </p:spPr>
+      </p:pic>
+      <p:pic>
+        <p:nvPicPr>
+          <p:cNvPr id="14" name="Image 13"/>
+          <p:cNvPicPr>
+            <a:picLocks noChangeAspect="1"/>
+          </p:cNvPicPr>
+          <p:nvPr/>
+        </p:nvPicPr>
+        <p:blipFill>
+          <a:blip r:embed="rId3" cstate="email">
+            <a:extLst>
+              <a:ext uri="{28A0092B-C50C-407E-A947-70E740481C1C}">
+                <a14:useLocalDpi xmlns:a14="http://schemas.microsoft.com/office/drawing/2010/main" val="0"/>
+              </a:ext>
+            </a:extLst>
+          </a:blip>
+          <a:stretch>
+            <a:fillRect/>
+          </a:stretch>
+        </p:blipFill>
+        <p:spPr>
+          <a:xfrm>
+            <a:off x="1035781" y="3645024"/>
+            <a:ext cx="976437" cy="271021"/>
+          </a:xfrm>
+          <a:prstGeom prst="rect">
+            <a:avLst/>
+          </a:prstGeom>
+        </p:spPr>
+      </p:pic>
+      <p:pic>
+        <p:nvPicPr>
+          <p:cNvPr id="15" name="Image 14"/>
+          <p:cNvPicPr>
+            <a:picLocks noChangeAspect="1"/>
+          </p:cNvPicPr>
+          <p:nvPr/>
+        </p:nvPicPr>
+        <p:blipFill>
+          <a:blip r:embed="rId4" cstate="email">
+            <a:extLst>
+              <a:ext uri="{28A0092B-C50C-407E-A947-70E740481C1C}">
+                <a14:useLocalDpi xmlns:a14="http://schemas.microsoft.com/office/drawing/2010/main" val="0"/>
+              </a:ext>
+            </a:extLst>
+          </a:blip>
+          <a:stretch>
+            <a:fillRect/>
+          </a:stretch>
+        </p:blipFill>
+        <p:spPr>
+          <a:xfrm>
+            <a:off x="11435" y="4326821"/>
+            <a:ext cx="1071522" cy="803642"/>
+          </a:xfrm>
+          <a:prstGeom prst="rect">
+            <a:avLst/>
+          </a:prstGeom>
+        </p:spPr>
+      </p:pic>
+      <p:pic>
+        <p:nvPicPr>
+          <p:cNvPr id="16" name="Image 15"/>
+          <p:cNvPicPr>
+            <a:picLocks noChangeAspect="1"/>
+          </p:cNvPicPr>
+          <p:nvPr/>
+        </p:nvPicPr>
+        <p:blipFill>
+          <a:blip r:embed="rId5" cstate="email">
+            <a:extLst>
+              <a:ext uri="{28A0092B-C50C-407E-A947-70E740481C1C}">
+                <a14:useLocalDpi xmlns:a14="http://schemas.microsoft.com/office/drawing/2010/main" val="0"/>
+              </a:ext>
+            </a:extLst>
+          </a:blip>
+          <a:stretch>
+            <a:fillRect/>
+          </a:stretch>
+        </p:blipFill>
+        <p:spPr>
+          <a:xfrm>
+            <a:off x="6019799" y="1548840"/>
+            <a:ext cx="1694681" cy="1320354"/>
+          </a:xfrm>
+          <a:prstGeom prst="rect">
+            <a:avLst/>
+          </a:prstGeom>
+        </p:spPr>
+      </p:pic>
+      <p:pic>
+        <p:nvPicPr>
+          <p:cNvPr id="17" name="Image 16"/>
+          <p:cNvPicPr>
+            <a:picLocks noChangeAspect="1"/>
+          </p:cNvPicPr>
+          <p:nvPr/>
+        </p:nvPicPr>
+        <p:blipFill>
+          <a:blip r:embed="rId6" cstate="email">
+            <a:extLst>
+              <a:ext uri="{28A0092B-C50C-407E-A947-70E740481C1C}">
+                <a14:useLocalDpi xmlns:a14="http://schemas.microsoft.com/office/drawing/2010/main" val="0"/>
+              </a:ext>
+            </a:extLst>
+          </a:blip>
+          <a:stretch>
+            <a:fillRect/>
+          </a:stretch>
+        </p:blipFill>
+        <p:spPr>
+          <a:xfrm>
+            <a:off x="6019800" y="4077072"/>
+            <a:ext cx="1694681" cy="1694681"/>
+          </a:xfrm>
+          <a:prstGeom prst="rect">
+            <a:avLst/>
+          </a:prstGeom>
+        </p:spPr>
+      </p:pic>
+      <p:cxnSp>
+        <p:nvCxnSpPr>
+          <p:cNvPr id="18" name="Connecteur droit avec flèche 17"/>
+          <p:cNvCxnSpPr>
+            <a:cxnSpLocks/>
+            <a:endCxn id="16" idx="1"/>
+          </p:cNvCxnSpPr>
+          <p:nvPr/>
+        </p:nvCxnSpPr>
+        <p:spPr>
+          <a:xfrm flipV="1">
+            <a:off x="2267744" y="2209017"/>
+            <a:ext cx="3752055" cy="660177"/>
+          </a:xfrm>
+          <a:prstGeom prst="straightConnector1">
+            <a:avLst/>
+          </a:prstGeom>
+          <a:ln w="38100">
+            <a:solidFill>
+              <a:schemeClr val="bg1"/>
+            </a:solidFill>
+            <a:tailEnd type="triangle"/>
+          </a:ln>
+        </p:spPr>
+        <p:style>
+          <a:lnRef idx="1">
+            <a:schemeClr val="accent1"/>
+          </a:lnRef>
+          <a:fillRef idx="0">
+            <a:schemeClr val="accent1"/>
+          </a:fillRef>
+          <a:effectRef idx="0">
+            <a:schemeClr val="accent1"/>
+          </a:effectRef>
+          <a:fontRef idx="minor">
+            <a:schemeClr val="tx1"/>
+          </a:fontRef>
+        </p:style>
+      </p:cxnSp>
+      <p:cxnSp>
+        <p:nvCxnSpPr>
+          <p:cNvPr id="23" name="Connecteur droit avec flèche 22"/>
+          <p:cNvCxnSpPr>
+            <a:cxnSpLocks/>
+            <a:endCxn id="17" idx="1"/>
+          </p:cNvCxnSpPr>
+          <p:nvPr/>
+        </p:nvCxnSpPr>
+        <p:spPr>
+          <a:xfrm>
+            <a:off x="2195736" y="3916045"/>
+            <a:ext cx="3824064" cy="1008368"/>
+          </a:xfrm>
+          <a:prstGeom prst="straightConnector1">
+            <a:avLst/>
+          </a:prstGeom>
+          <a:ln w="38100">
+            <a:solidFill>
+              <a:schemeClr val="bg1"/>
+            </a:solidFill>
+            <a:tailEnd type="triangle"/>
+          </a:ln>
+        </p:spPr>
+        <p:style>
+          <a:lnRef idx="1">
+            <a:schemeClr val="accent1"/>
+          </a:lnRef>
+          <a:fillRef idx="0">
+            <a:schemeClr val="accent1"/>
+          </a:fillRef>
+          <a:effectRef idx="0">
+            <a:schemeClr val="accent1"/>
+          </a:effectRef>
+          <a:fontRef idx="minor">
+            <a:schemeClr val="tx1"/>
+          </a:fontRef>
+        </p:style>
+      </p:cxnSp>
+      <p:pic>
+        <p:nvPicPr>
+          <p:cNvPr id="26" name="Image 25"/>
+          <p:cNvPicPr>
+            <a:picLocks noChangeAspect="1"/>
+          </p:cNvPicPr>
+          <p:nvPr/>
+        </p:nvPicPr>
+        <p:blipFill>
+          <a:blip r:embed="rId7" cstate="email">
+            <a:extLst>
+              <a:ext uri="{28A0092B-C50C-407E-A947-70E740481C1C}">
+                <a14:useLocalDpi xmlns:a14="http://schemas.microsoft.com/office/drawing/2010/main" val="0"/>
+              </a:ext>
+            </a:extLst>
+          </a:blip>
+          <a:stretch>
+            <a:fillRect/>
+          </a:stretch>
+        </p:blipFill>
+        <p:spPr>
+          <a:xfrm>
+            <a:off x="783028" y="4318584"/>
+            <a:ext cx="1704539" cy="881198"/>
+          </a:xfrm>
+          <a:prstGeom prst="rect">
+            <a:avLst/>
+          </a:prstGeom>
+        </p:spPr>
+      </p:pic>
+      <p:pic>
+        <p:nvPicPr>
+          <p:cNvPr id="27" name="Image 26"/>
+          <p:cNvPicPr>
+            <a:picLocks noChangeAspect="1"/>
+          </p:cNvPicPr>
+          <p:nvPr/>
+        </p:nvPicPr>
+        <p:blipFill>
+          <a:blip r:embed="rId8" cstate="email">
+            <a:extLst>
+              <a:ext uri="{28A0092B-C50C-407E-A947-70E740481C1C}">
+                <a14:useLocalDpi xmlns:a14="http://schemas.microsoft.com/office/drawing/2010/main" val="0"/>
+              </a:ext>
+            </a:extLst>
+          </a:blip>
+          <a:stretch>
+            <a:fillRect/>
+          </a:stretch>
+        </p:blipFill>
+        <p:spPr>
+          <a:xfrm>
+            <a:off x="6156176" y="2636704"/>
+            <a:ext cx="1660453" cy="603089"/>
+          </a:xfrm>
+          <a:prstGeom prst="rect">
+            <a:avLst/>
+          </a:prstGeom>
+        </p:spPr>
+      </p:pic>
+      <p:sp>
+        <p:nvSpPr>
+          <p:cNvPr id="28" name="ZoneTexte 27"/>
+          <p:cNvSpPr txBox="1"/>
+          <p:nvPr/>
+        </p:nvSpPr>
+        <p:spPr>
+          <a:xfrm>
+            <a:off x="3419872" y="2132856"/>
+            <a:ext cx="800219" cy="369332"/>
+          </a:xfrm>
+          <a:prstGeom prst="rect">
+            <a:avLst/>
+          </a:prstGeom>
+          <a:noFill/>
+        </p:spPr>
+        <p:txBody>
+          <a:bodyPr wrap="none" rtlCol="0">
+            <a:spAutoFit/>
+          </a:bodyPr>
+          <a:lstStyle/>
+          <a:p>
+            <a:r>
+              <a:rPr lang="fr-FR" dirty="0" smtClean="0">
+                <a:solidFill>
+                  <a:schemeClr val="bg2">
+                    <a:lumMod val="50000"/>
+                  </a:schemeClr>
+                </a:solidFill>
+              </a:rPr>
+              <a:t>REST</a:t>
+            </a:r>
+            <a:endParaRPr lang="fr-FR" dirty="0">
+              <a:solidFill>
+                <a:schemeClr val="bg2">
+                  <a:lumMod val="50000"/>
+                </a:schemeClr>
+              </a:solidFill>
+            </a:endParaRPr>
+          </a:p>
+        </p:txBody>
+      </p:sp>
+      <p:sp>
+        <p:nvSpPr>
+          <p:cNvPr id="30" name="ZoneTexte 29"/>
+          <p:cNvSpPr txBox="1"/>
+          <p:nvPr/>
+        </p:nvSpPr>
+        <p:spPr>
+          <a:xfrm>
+            <a:off x="3362249" y="4555080"/>
+            <a:ext cx="1428596" cy="369332"/>
+          </a:xfrm>
+          <a:prstGeom prst="rect">
+            <a:avLst/>
+          </a:prstGeom>
+          <a:noFill/>
+        </p:spPr>
+        <p:txBody>
+          <a:bodyPr wrap="none" rtlCol="0">
+            <a:spAutoFit/>
+          </a:bodyPr>
+          <a:lstStyle/>
+          <a:p>
+            <a:r>
+              <a:rPr lang="fr-FR" dirty="0" err="1" smtClean="0">
+                <a:solidFill>
+                  <a:schemeClr val="bg2">
+                    <a:lumMod val="50000"/>
+                  </a:schemeClr>
+                </a:solidFill>
+              </a:rPr>
+              <a:t>Spring</a:t>
+            </a:r>
+            <a:r>
+              <a:rPr lang="fr-FR" dirty="0" smtClean="0">
+                <a:solidFill>
+                  <a:schemeClr val="bg2">
+                    <a:lumMod val="50000"/>
+                  </a:schemeClr>
+                </a:solidFill>
+              </a:rPr>
+              <a:t> MVC</a:t>
+            </a:r>
+            <a:endParaRPr lang="fr-FR" dirty="0">
+              <a:solidFill>
+                <a:schemeClr val="bg2">
+                  <a:lumMod val="50000"/>
+                </a:schemeClr>
+              </a:solidFill>
+            </a:endParaRPr>
           </a:p>
         </p:txBody>
       </p:sp>
@@ -10679,6 +11158,265 @@
       <p:transition/>
     </mc:Fallback>
   </mc:AlternateContent>
+  <p:timing>
+    <p:tnLst>
+      <p:par>
+        <p:cTn id="1" dur="indefinite" restart="never" nodeType="tmRoot">
+          <p:childTnLst>
+            <p:seq concurrent="1" nextAc="seek">
+              <p:cTn id="2" dur="indefinite" nodeType="mainSeq">
+                <p:childTnLst>
+                  <p:par>
+                    <p:cTn id="3" fill="hold">
+                      <p:stCondLst>
+                        <p:cond delay="indefinite"/>
+                      </p:stCondLst>
+                      <p:childTnLst>
+                        <p:par>
+                          <p:cTn id="4" fill="hold">
+                            <p:stCondLst>
+                              <p:cond delay="0"/>
+                            </p:stCondLst>
+                            <p:childTnLst>
+                              <p:par>
+                                <p:cTn id="5" presetID="1" presetClass="entr" presetSubtype="0" fill="hold" nodeType="clickEffect">
+                                  <p:stCondLst>
+                                    <p:cond delay="0"/>
+                                  </p:stCondLst>
+                                  <p:childTnLst>
+                                    <p:set>
+                                      <p:cBhvr>
+                                        <p:cTn id="6" dur="1" fill="hold">
+                                          <p:stCondLst>
+                                            <p:cond delay="0"/>
+                                          </p:stCondLst>
+                                        </p:cTn>
+                                        <p:tgtEl>
+                                          <p:spTgt spid="27"/>
+                                        </p:tgtEl>
+                                        <p:attrNameLst>
+                                          <p:attrName>style.visibility</p:attrName>
+                                        </p:attrNameLst>
+                                      </p:cBhvr>
+                                      <p:to>
+                                        <p:strVal val="visible"/>
+                                      </p:to>
+                                    </p:set>
+                                  </p:childTnLst>
+                                </p:cTn>
+                              </p:par>
+                              <p:par>
+                                <p:cTn id="7" presetID="1" presetClass="entr" presetSubtype="0" fill="hold" grpId="0" nodeType="withEffect">
+                                  <p:stCondLst>
+                                    <p:cond delay="0"/>
+                                  </p:stCondLst>
+                                  <p:childTnLst>
+                                    <p:set>
+                                      <p:cBhvr>
+                                        <p:cTn id="8" dur="1" fill="hold">
+                                          <p:stCondLst>
+                                            <p:cond delay="0"/>
+                                          </p:stCondLst>
+                                        </p:cTn>
+                                        <p:tgtEl>
+                                          <p:spTgt spid="28"/>
+                                        </p:tgtEl>
+                                        <p:attrNameLst>
+                                          <p:attrName>style.visibility</p:attrName>
+                                        </p:attrNameLst>
+                                      </p:cBhvr>
+                                      <p:to>
+                                        <p:strVal val="visible"/>
+                                      </p:to>
+                                    </p:set>
+                                  </p:childTnLst>
+                                </p:cTn>
+                              </p:par>
+                              <p:par>
+                                <p:cTn id="9" presetID="1" presetClass="entr" presetSubtype="0" fill="hold" nodeType="withEffect">
+                                  <p:stCondLst>
+                                    <p:cond delay="0"/>
+                                  </p:stCondLst>
+                                  <p:childTnLst>
+                                    <p:set>
+                                      <p:cBhvr>
+                                        <p:cTn id="10" dur="1" fill="hold">
+                                          <p:stCondLst>
+                                            <p:cond delay="0"/>
+                                          </p:stCondLst>
+                                        </p:cTn>
+                                        <p:tgtEl>
+                                          <p:spTgt spid="16"/>
+                                        </p:tgtEl>
+                                        <p:attrNameLst>
+                                          <p:attrName>style.visibility</p:attrName>
+                                        </p:attrNameLst>
+                                      </p:cBhvr>
+                                      <p:to>
+                                        <p:strVal val="visible"/>
+                                      </p:to>
+                                    </p:set>
+                                  </p:childTnLst>
+                                </p:cTn>
+                              </p:par>
+                              <p:par>
+                                <p:cTn id="11" presetID="1" presetClass="entr" presetSubtype="0" fill="hold" nodeType="withEffect">
+                                  <p:stCondLst>
+                                    <p:cond delay="0"/>
+                                  </p:stCondLst>
+                                  <p:childTnLst>
+                                    <p:set>
+                                      <p:cBhvr>
+                                        <p:cTn id="12" dur="1" fill="hold">
+                                          <p:stCondLst>
+                                            <p:cond delay="0"/>
+                                          </p:stCondLst>
+                                        </p:cTn>
+                                        <p:tgtEl>
+                                          <p:spTgt spid="18"/>
+                                        </p:tgtEl>
+                                        <p:attrNameLst>
+                                          <p:attrName>style.visibility</p:attrName>
+                                        </p:attrNameLst>
+                                      </p:cBhvr>
+                                      <p:to>
+                                        <p:strVal val="visible"/>
+                                      </p:to>
+                                    </p:set>
+                                  </p:childTnLst>
+                                </p:cTn>
+                              </p:par>
+                            </p:childTnLst>
+                          </p:cTn>
+                        </p:par>
+                      </p:childTnLst>
+                    </p:cTn>
+                  </p:par>
+                  <p:par>
+                    <p:cTn id="13" fill="hold">
+                      <p:stCondLst>
+                        <p:cond delay="indefinite"/>
+                      </p:stCondLst>
+                      <p:childTnLst>
+                        <p:par>
+                          <p:cTn id="14" fill="hold">
+                            <p:stCondLst>
+                              <p:cond delay="0"/>
+                            </p:stCondLst>
+                            <p:childTnLst>
+                              <p:par>
+                                <p:cTn id="15" presetID="1" presetClass="entr" presetSubtype="0" fill="hold" nodeType="clickEffect">
+                                  <p:stCondLst>
+                                    <p:cond delay="0"/>
+                                  </p:stCondLst>
+                                  <p:childTnLst>
+                                    <p:set>
+                                      <p:cBhvr>
+                                        <p:cTn id="16" dur="1" fill="hold">
+                                          <p:stCondLst>
+                                            <p:cond delay="0"/>
+                                          </p:stCondLst>
+                                        </p:cTn>
+                                        <p:tgtEl>
+                                          <p:spTgt spid="23"/>
+                                        </p:tgtEl>
+                                        <p:attrNameLst>
+                                          <p:attrName>style.visibility</p:attrName>
+                                        </p:attrNameLst>
+                                      </p:cBhvr>
+                                      <p:to>
+                                        <p:strVal val="visible"/>
+                                      </p:to>
+                                    </p:set>
+                                  </p:childTnLst>
+                                </p:cTn>
+                              </p:par>
+                              <p:par>
+                                <p:cTn id="17" presetID="1" presetClass="entr" presetSubtype="0" fill="hold" grpId="0" nodeType="withEffect">
+                                  <p:stCondLst>
+                                    <p:cond delay="0"/>
+                                  </p:stCondLst>
+                                  <p:childTnLst>
+                                    <p:set>
+                                      <p:cBhvr>
+                                        <p:cTn id="18" dur="1" fill="hold">
+                                          <p:stCondLst>
+                                            <p:cond delay="0"/>
+                                          </p:stCondLst>
+                                        </p:cTn>
+                                        <p:tgtEl>
+                                          <p:spTgt spid="30"/>
+                                        </p:tgtEl>
+                                        <p:attrNameLst>
+                                          <p:attrName>style.visibility</p:attrName>
+                                        </p:attrNameLst>
+                                      </p:cBhvr>
+                                      <p:to>
+                                        <p:strVal val="visible"/>
+                                      </p:to>
+                                    </p:set>
+                                  </p:childTnLst>
+                                </p:cTn>
+                              </p:par>
+                              <p:par>
+                                <p:cTn id="19" presetID="1" presetClass="entr" presetSubtype="0" fill="hold" nodeType="withEffect">
+                                  <p:stCondLst>
+                                    <p:cond delay="0"/>
+                                  </p:stCondLst>
+                                  <p:childTnLst>
+                                    <p:set>
+                                      <p:cBhvr>
+                                        <p:cTn id="20" dur="1" fill="hold">
+                                          <p:stCondLst>
+                                            <p:cond delay="0"/>
+                                          </p:stCondLst>
+                                        </p:cTn>
+                                        <p:tgtEl>
+                                          <p:spTgt spid="17"/>
+                                        </p:tgtEl>
+                                        <p:attrNameLst>
+                                          <p:attrName>style.visibility</p:attrName>
+                                        </p:attrNameLst>
+                                      </p:cBhvr>
+                                      <p:to>
+                                        <p:strVal val="visible"/>
+                                      </p:to>
+                                    </p:set>
+                                  </p:childTnLst>
+                                </p:cTn>
+                              </p:par>
+                            </p:childTnLst>
+                          </p:cTn>
+                        </p:par>
+                      </p:childTnLst>
+                    </p:cTn>
+                  </p:par>
+                </p:childTnLst>
+              </p:cTn>
+              <p:prevCondLst>
+                <p:cond evt="onPrev" delay="0">
+                  <p:tgtEl>
+                    <p:sldTgt/>
+                  </p:tgtEl>
+                </p:cond>
+              </p:prevCondLst>
+              <p:nextCondLst>
+                <p:cond evt="onNext" delay="0">
+                  <p:tgtEl>
+                    <p:sldTgt/>
+                  </p:tgtEl>
+                </p:cond>
+              </p:nextCondLst>
+            </p:seq>
+          </p:childTnLst>
+        </p:cTn>
+      </p:par>
+    </p:tnLst>
+    <p:bldLst>
+      <p:bldP spid="28" grpId="0"/>
+      <p:bldP spid="30" grpId="0"/>
+    </p:bldLst>
+  </p:timing>
 </p:sld>
 </file>
 

</xml_diff>